<commit_message>
Revert back to previous pptx
Revert back to PPTX where graphs are lines up, increased scale and sent to back. Now in line with the bounding box.
</commit_message>
<xml_diff>
--- a/FinalProject.pptx
+++ b/FinalProject.pptx
@@ -123,75 +123,6 @@
 </p:presentation>
 </file>
 
-<file path=ppt/changesInfos/changesInfo1.xml><?xml version="1.0" encoding="utf-8"?>
-<pc:chgInfo xmlns:a="http://schemas.openxmlformats.org/drawingml/2006/main" xmlns:r="http://schemas.openxmlformats.org/officeDocument/2006/relationships" xmlns:ac="http://schemas.microsoft.com/office/drawing/2013/main/command" xmlns:pc="http://schemas.microsoft.com/office/powerpoint/2013/main/command">
-  <pc:docChgLst>
-    <pc:chgData name="Seth Hillis" userId="a87ca59e48a905ce" providerId="LiveId" clId="{A975DEFC-5A2E-4FFE-A2C0-8F30C525667E}"/>
-    <pc:docChg chg="modSld">
-      <pc:chgData name="Seth Hillis" userId="a87ca59e48a905ce" providerId="LiveId" clId="{A975DEFC-5A2E-4FFE-A2C0-8F30C525667E}" dt="2025-05-02T05:10:18.875" v="17" actId="167"/>
-      <pc:docMkLst>
-        <pc:docMk/>
-      </pc:docMkLst>
-      <pc:sldChg chg="modSp mod">
-        <pc:chgData name="Seth Hillis" userId="a87ca59e48a905ce" providerId="LiveId" clId="{A975DEFC-5A2E-4FFE-A2C0-8F30C525667E}" dt="2025-05-02T05:10:18.875" v="17" actId="167"/>
-        <pc:sldMkLst>
-          <pc:docMk/>
-          <pc:sldMk cId="3171296435" sldId="263"/>
-        </pc:sldMkLst>
-        <pc:picChg chg="mod ord">
-          <ac:chgData name="Seth Hillis" userId="a87ca59e48a905ce" providerId="LiveId" clId="{A975DEFC-5A2E-4FFE-A2C0-8F30C525667E}" dt="2025-05-02T05:10:18.875" v="17" actId="167"/>
-          <ac:picMkLst>
-            <pc:docMk/>
-            <pc:sldMk cId="3171296435" sldId="263"/>
-            <ac:picMk id="13" creationId="{E4141EB8-7E05-918B-3BCC-192C5F6B091A}"/>
-          </ac:picMkLst>
-        </pc:picChg>
-        <pc:picChg chg="mod ord">
-          <ac:chgData name="Seth Hillis" userId="a87ca59e48a905ce" providerId="LiveId" clId="{A975DEFC-5A2E-4FFE-A2C0-8F30C525667E}" dt="2025-05-02T05:10:18.875" v="17" actId="167"/>
-          <ac:picMkLst>
-            <pc:docMk/>
-            <pc:sldMk cId="3171296435" sldId="263"/>
-            <ac:picMk id="18" creationId="{BED0372F-052B-17D7-9372-56396D209E14}"/>
-          </ac:picMkLst>
-        </pc:picChg>
-        <pc:picChg chg="mod ord">
-          <ac:chgData name="Seth Hillis" userId="a87ca59e48a905ce" providerId="LiveId" clId="{A975DEFC-5A2E-4FFE-A2C0-8F30C525667E}" dt="2025-05-02T05:10:18.875" v="17" actId="167"/>
-          <ac:picMkLst>
-            <pc:docMk/>
-            <pc:sldMk cId="3171296435" sldId="263"/>
-            <ac:picMk id="21" creationId="{D4A8C1F9-80A2-C49D-72CC-A69CC9903401}"/>
-          </ac:picMkLst>
-        </pc:picChg>
-        <pc:picChg chg="mod ord">
-          <ac:chgData name="Seth Hillis" userId="a87ca59e48a905ce" providerId="LiveId" clId="{A975DEFC-5A2E-4FFE-A2C0-8F30C525667E}" dt="2025-05-02T05:10:18.875" v="17" actId="167"/>
-          <ac:picMkLst>
-            <pc:docMk/>
-            <pc:sldMk cId="3171296435" sldId="263"/>
-            <ac:picMk id="25" creationId="{C989FA38-3F13-9DAA-4271-9C56CA7BE216}"/>
-          </ac:picMkLst>
-        </pc:picChg>
-        <pc:picChg chg="mod ord">
-          <ac:chgData name="Seth Hillis" userId="a87ca59e48a905ce" providerId="LiveId" clId="{A975DEFC-5A2E-4FFE-A2C0-8F30C525667E}" dt="2025-05-02T05:10:18.875" v="17" actId="167"/>
-          <ac:picMkLst>
-            <pc:docMk/>
-            <pc:sldMk cId="3171296435" sldId="263"/>
-            <ac:picMk id="28" creationId="{1A4358E2-2044-68DC-718F-2C00B07B7E67}"/>
-          </ac:picMkLst>
-        </pc:picChg>
-        <pc:picChg chg="mod ord">
-          <ac:chgData name="Seth Hillis" userId="a87ca59e48a905ce" providerId="LiveId" clId="{A975DEFC-5A2E-4FFE-A2C0-8F30C525667E}" dt="2025-05-02T05:10:18.875" v="17" actId="167"/>
-          <ac:picMkLst>
-            <pc:docMk/>
-            <pc:sldMk cId="3171296435" sldId="263"/>
-            <ac:picMk id="31" creationId="{1F170871-8043-9637-39D6-5E905A0296D2}"/>
-          </ac:picMkLst>
-        </pc:picChg>
-      </pc:sldChg>
-    </pc:docChg>
-  </pc:docChgLst>
-</pc:chgInfo>
-</file>
-
 <file path=ppt/slideLayouts/slideLayout1.xml><?xml version="1.0" encoding="utf-8"?>
 <p:sldLayout xmlns:a="http://schemas.openxmlformats.org/drawingml/2006/main" xmlns:r="http://schemas.openxmlformats.org/officeDocument/2006/relationships" xmlns:p="http://schemas.openxmlformats.org/presentationml/2006/main" type="title" preserve="1">
   <p:cSld name="Title Slide">
@@ -323,7 +254,7 @@
           <a:p>
             <a:fld id="{8B2A89D0-1805-4490-BCAB-9BF0585E218B}" type="datetimeFigureOut">
               <a:rPr lang="en-US" smtClean="0"/>
-              <a:t>5/1/2025</a:t>
+              <a:t>5/7/2025</a:t>
             </a:fld>
             <a:endParaRPr lang="en-US"/>
           </a:p>
@@ -493,7 +424,7 @@
           <a:p>
             <a:fld id="{8B2A89D0-1805-4490-BCAB-9BF0585E218B}" type="datetimeFigureOut">
               <a:rPr lang="en-US" smtClean="0"/>
-              <a:t>5/1/2025</a:t>
+              <a:t>5/7/2025</a:t>
             </a:fld>
             <a:endParaRPr lang="en-US"/>
           </a:p>
@@ -673,7 +604,7 @@
           <a:p>
             <a:fld id="{8B2A89D0-1805-4490-BCAB-9BF0585E218B}" type="datetimeFigureOut">
               <a:rPr lang="en-US" smtClean="0"/>
-              <a:t>5/1/2025</a:t>
+              <a:t>5/7/2025</a:t>
             </a:fld>
             <a:endParaRPr lang="en-US"/>
           </a:p>
@@ -843,7 +774,7 @@
           <a:p>
             <a:fld id="{8B2A89D0-1805-4490-BCAB-9BF0585E218B}" type="datetimeFigureOut">
               <a:rPr lang="en-US" smtClean="0"/>
-              <a:t>5/1/2025</a:t>
+              <a:t>5/7/2025</a:t>
             </a:fld>
             <a:endParaRPr lang="en-US"/>
           </a:p>
@@ -1087,7 +1018,7 @@
           <a:p>
             <a:fld id="{8B2A89D0-1805-4490-BCAB-9BF0585E218B}" type="datetimeFigureOut">
               <a:rPr lang="en-US" smtClean="0"/>
-              <a:t>5/1/2025</a:t>
+              <a:t>5/7/2025</a:t>
             </a:fld>
             <a:endParaRPr lang="en-US"/>
           </a:p>
@@ -1319,7 +1250,7 @@
           <a:p>
             <a:fld id="{8B2A89D0-1805-4490-BCAB-9BF0585E218B}" type="datetimeFigureOut">
               <a:rPr lang="en-US" smtClean="0"/>
-              <a:t>5/1/2025</a:t>
+              <a:t>5/7/2025</a:t>
             </a:fld>
             <a:endParaRPr lang="en-US"/>
           </a:p>
@@ -1686,7 +1617,7 @@
           <a:p>
             <a:fld id="{8B2A89D0-1805-4490-BCAB-9BF0585E218B}" type="datetimeFigureOut">
               <a:rPr lang="en-US" smtClean="0"/>
-              <a:t>5/1/2025</a:t>
+              <a:t>5/7/2025</a:t>
             </a:fld>
             <a:endParaRPr lang="en-US"/>
           </a:p>
@@ -1804,7 +1735,7 @@
           <a:p>
             <a:fld id="{8B2A89D0-1805-4490-BCAB-9BF0585E218B}" type="datetimeFigureOut">
               <a:rPr lang="en-US" smtClean="0"/>
-              <a:t>5/1/2025</a:t>
+              <a:t>5/7/2025</a:t>
             </a:fld>
             <a:endParaRPr lang="en-US"/>
           </a:p>
@@ -1899,7 +1830,7 @@
           <a:p>
             <a:fld id="{8B2A89D0-1805-4490-BCAB-9BF0585E218B}" type="datetimeFigureOut">
               <a:rPr lang="en-US" smtClean="0"/>
-              <a:t>5/1/2025</a:t>
+              <a:t>5/7/2025</a:t>
             </a:fld>
             <a:endParaRPr lang="en-US"/>
           </a:p>
@@ -2176,7 +2107,7 @@
           <a:p>
             <a:fld id="{8B2A89D0-1805-4490-BCAB-9BF0585E218B}" type="datetimeFigureOut">
               <a:rPr lang="en-US" smtClean="0"/>
-              <a:t>5/1/2025</a:t>
+              <a:t>5/7/2025</a:t>
             </a:fld>
             <a:endParaRPr lang="en-US"/>
           </a:p>
@@ -2433,7 +2364,7 @@
           <a:p>
             <a:fld id="{8B2A89D0-1805-4490-BCAB-9BF0585E218B}" type="datetimeFigureOut">
               <a:rPr lang="en-US" smtClean="0"/>
-              <a:t>5/1/2025</a:t>
+              <a:t>5/7/2025</a:t>
             </a:fld>
             <a:endParaRPr lang="en-US"/>
           </a:p>
@@ -2646,7 +2577,7 @@
           <a:p>
             <a:fld id="{8B2A89D0-1805-4490-BCAB-9BF0585E218B}" type="datetimeFigureOut">
               <a:rPr lang="en-US" smtClean="0"/>
-              <a:t>5/1/2025</a:t>
+              <a:t>5/7/2025</a:t>
             </a:fld>
             <a:endParaRPr lang="en-US"/>
           </a:p>
@@ -3087,7 +3018,7 @@
         </p:blipFill>
         <p:spPr>
           <a:xfrm>
-            <a:off x="555426" y="7531612"/>
+            <a:off x="555426" y="7607555"/>
             <a:ext cx="4389129" cy="3291847"/>
           </a:xfrm>
           <a:prstGeom prst="rect">
@@ -3123,7 +3054,7 @@
         </p:blipFill>
         <p:spPr>
           <a:xfrm>
-            <a:off x="11921969" y="11565020"/>
+            <a:off x="11921969" y="11640963"/>
             <a:ext cx="4389129" cy="3291847"/>
           </a:xfrm>
           <a:prstGeom prst="rect">
@@ -3159,7 +3090,7 @@
         </p:blipFill>
         <p:spPr>
           <a:xfrm>
-            <a:off x="757340" y="11592525"/>
+            <a:off x="757340" y="11668468"/>
             <a:ext cx="4389129" cy="3291847"/>
           </a:xfrm>
           <a:prstGeom prst="rect">
@@ -3195,7 +3126,7 @@
         </p:blipFill>
         <p:spPr>
           <a:xfrm>
-            <a:off x="6084573" y="11610093"/>
+            <a:off x="6084573" y="11686036"/>
             <a:ext cx="4389129" cy="3291847"/>
           </a:xfrm>
           <a:prstGeom prst="rect">
@@ -3231,7 +3162,7 @@
         </p:blipFill>
         <p:spPr>
           <a:xfrm>
-            <a:off x="12046009" y="7631629"/>
+            <a:off x="12046009" y="7707572"/>
             <a:ext cx="4389129" cy="3291847"/>
           </a:xfrm>
           <a:prstGeom prst="rect">
@@ -3267,7 +3198,7 @@
         </p:blipFill>
         <p:spPr>
           <a:xfrm>
-            <a:off x="6084573" y="7531612"/>
+            <a:off x="6084573" y="7607555"/>
             <a:ext cx="4389129" cy="3291847"/>
           </a:xfrm>
           <a:prstGeom prst="rect">

</xml_diff>

<commit_message>
Filled in interpretation section
</commit_message>
<xml_diff>
--- a/FinalProject.pptx
+++ b/FinalProject.pptx
@@ -3373,7 +3373,7 @@
                 <a:spcPts val="150"/>
               </a:spcBef>
             </a:pPr>
-            <a:endParaRPr lang="en-US" sz="1200" dirty="0"/>
+            <a:endParaRPr lang="en-US" sz="1200"/>
           </a:p>
           <a:p>
             <a:pPr marL="457200">
@@ -3381,109 +3381,109 @@
                 <a:spcPts val="150"/>
               </a:spcBef>
             </a:pPr>
-            <a:endParaRPr lang="en-US" sz="1200" dirty="0"/>
-          </a:p>
-          <a:p>
-            <a:endParaRPr lang="en-US" sz="4400" dirty="0"/>
-          </a:p>
-          <a:p>
-            <a:endParaRPr lang="en-US" sz="4000" dirty="0"/>
-          </a:p>
-          <a:p>
-            <a:endParaRPr lang="en-US" sz="4000" dirty="0"/>
-          </a:p>
-          <a:p>
-            <a:endParaRPr lang="en-US" sz="4000" dirty="0"/>
-          </a:p>
-          <a:p>
-            <a:endParaRPr lang="en-US" sz="4000" dirty="0"/>
-          </a:p>
-          <a:p>
-            <a:endParaRPr lang="en-US" sz="4000" dirty="0"/>
-          </a:p>
-          <a:p>
-            <a:endParaRPr lang="en-US" sz="4000" dirty="0"/>
-          </a:p>
-          <a:p>
-            <a:endParaRPr lang="en-US" sz="4000" dirty="0"/>
-          </a:p>
-          <a:p>
-            <a:endParaRPr lang="en-US" sz="4000" dirty="0"/>
-          </a:p>
-          <a:p>
-            <a:endParaRPr lang="en-US" sz="4000" dirty="0"/>
-          </a:p>
-          <a:p>
-            <a:endParaRPr lang="en-US" sz="4000" dirty="0"/>
-          </a:p>
-          <a:p>
-            <a:endParaRPr lang="en-US" sz="4000" dirty="0"/>
-          </a:p>
-          <a:p>
-            <a:endParaRPr lang="en-US" sz="4000" dirty="0"/>
-          </a:p>
-          <a:p>
-            <a:endParaRPr lang="en-US" sz="4000" dirty="0"/>
-          </a:p>
-          <a:p>
-            <a:endParaRPr lang="en-US" sz="4000" dirty="0"/>
-          </a:p>
-          <a:p>
-            <a:endParaRPr lang="en-US" sz="4000" dirty="0"/>
-          </a:p>
-          <a:p>
-            <a:endParaRPr lang="en-US" sz="4000" dirty="0"/>
-          </a:p>
-          <a:p>
-            <a:endParaRPr lang="en-US" sz="4000" dirty="0"/>
-          </a:p>
-          <a:p>
-            <a:endParaRPr lang="en-US" sz="4000" dirty="0"/>
-          </a:p>
-          <a:p>
-            <a:endParaRPr lang="en-US" sz="4000" dirty="0"/>
-          </a:p>
-          <a:p>
-            <a:endParaRPr lang="en-US" sz="4000" dirty="0"/>
-          </a:p>
-          <a:p>
-            <a:endParaRPr lang="en-US" sz="4000" dirty="0"/>
-          </a:p>
-          <a:p>
-            <a:endParaRPr lang="en-US" sz="4000" dirty="0"/>
-          </a:p>
-          <a:p>
-            <a:endParaRPr lang="en-US" sz="4000" dirty="0"/>
-          </a:p>
-          <a:p>
-            <a:endParaRPr lang="en-US" sz="4000" dirty="0"/>
-          </a:p>
-          <a:p>
-            <a:endParaRPr lang="en-US" dirty="0"/>
-          </a:p>
-          <a:p>
-            <a:endParaRPr lang="en-US" dirty="0"/>
-          </a:p>
-          <a:p>
-            <a:endParaRPr lang="en-US" dirty="0"/>
-          </a:p>
-          <a:p>
-            <a:endParaRPr lang="en-US" sz="800" dirty="0"/>
-          </a:p>
-          <a:p>
-            <a:endParaRPr lang="en-US" sz="800" dirty="0"/>
-          </a:p>
-          <a:p>
-            <a:r>
-              <a:rPr lang="en-US" sz="800" dirty="0"/>
+            <a:endParaRPr lang="en-US" sz="1200"/>
+          </a:p>
+          <a:p>
+            <a:endParaRPr lang="en-US" sz="4400"/>
+          </a:p>
+          <a:p>
+            <a:endParaRPr lang="en-US" sz="4000"/>
+          </a:p>
+          <a:p>
+            <a:endParaRPr lang="en-US" sz="4000"/>
+          </a:p>
+          <a:p>
+            <a:endParaRPr lang="en-US" sz="4000"/>
+          </a:p>
+          <a:p>
+            <a:endParaRPr lang="en-US" sz="4000"/>
+          </a:p>
+          <a:p>
+            <a:endParaRPr lang="en-US" sz="4000"/>
+          </a:p>
+          <a:p>
+            <a:endParaRPr lang="en-US" sz="4000"/>
+          </a:p>
+          <a:p>
+            <a:endParaRPr lang="en-US" sz="4000"/>
+          </a:p>
+          <a:p>
+            <a:endParaRPr lang="en-US" sz="4000"/>
+          </a:p>
+          <a:p>
+            <a:endParaRPr lang="en-US" sz="4000"/>
+          </a:p>
+          <a:p>
+            <a:endParaRPr lang="en-US" sz="4000"/>
+          </a:p>
+          <a:p>
+            <a:endParaRPr lang="en-US" sz="4000"/>
+          </a:p>
+          <a:p>
+            <a:endParaRPr lang="en-US" sz="4000"/>
+          </a:p>
+          <a:p>
+            <a:endParaRPr lang="en-US" sz="4000"/>
+          </a:p>
+          <a:p>
+            <a:endParaRPr lang="en-US" sz="4000"/>
+          </a:p>
+          <a:p>
+            <a:endParaRPr lang="en-US" sz="4000"/>
+          </a:p>
+          <a:p>
+            <a:endParaRPr lang="en-US" sz="4000"/>
+          </a:p>
+          <a:p>
+            <a:endParaRPr lang="en-US" sz="4000"/>
+          </a:p>
+          <a:p>
+            <a:endParaRPr lang="en-US" sz="4000"/>
+          </a:p>
+          <a:p>
+            <a:endParaRPr lang="en-US" sz="4000"/>
+          </a:p>
+          <a:p>
+            <a:endParaRPr lang="en-US" sz="4000"/>
+          </a:p>
+          <a:p>
+            <a:endParaRPr lang="en-US" sz="4000"/>
+          </a:p>
+          <a:p>
+            <a:endParaRPr lang="en-US" sz="4000"/>
+          </a:p>
+          <a:p>
+            <a:endParaRPr lang="en-US" sz="4000"/>
+          </a:p>
+          <a:p>
+            <a:endParaRPr lang="en-US" sz="4000"/>
+          </a:p>
+          <a:p>
+            <a:endParaRPr lang="en-US"/>
+          </a:p>
+          <a:p>
+            <a:endParaRPr lang="en-US"/>
+          </a:p>
+          <a:p>
+            <a:endParaRPr lang="en-US"/>
+          </a:p>
+          <a:p>
+            <a:endParaRPr lang="en-US" sz="800"/>
+          </a:p>
+          <a:p>
+            <a:endParaRPr lang="en-US" sz="800"/>
+          </a:p>
+          <a:p>
+            <a:r>
+              <a:rPr lang="en-US" sz="800"/>
               <a:t>.</a:t>
             </a:r>
           </a:p>
           <a:p>
-            <a:endParaRPr lang="en-US" sz="800" dirty="0"/>
-          </a:p>
-          <a:p>
-            <a:endParaRPr lang="en-US" sz="800" dirty="0"/>
+            <a:endParaRPr lang="en-US" sz="800"/>
+          </a:p>
+          <a:p>
+            <a:endParaRPr lang="en-US" sz="800"/>
           </a:p>
           <a:p>
             <a:endParaRPr lang="en-US" sz="800" dirty="0"/>
@@ -3718,7 +3718,7 @@
         <p:spPr>
           <a:xfrm>
             <a:off x="16767211" y="25162398"/>
-            <a:ext cx="15819120" cy="9110186"/>
+            <a:ext cx="15819120" cy="9017853"/>
           </a:xfrm>
           <a:prstGeom prst="rect">
             <a:avLst/>
@@ -3739,82 +3739,78 @@
           <a:lstStyle/>
           <a:p>
             <a:pPr marL="342900"/>
-            <a:endParaRPr lang="en-US" sz="4800" dirty="0">
+            <a:endParaRPr lang="en-US" sz="4000" dirty="0">
               <a:latin typeface="Klavika Light" panose="020B0506040000020004" pitchFamily="34" charset="0"/>
             </a:endParaRPr>
           </a:p>
           <a:p>
             <a:pPr marL="342900"/>
-            <a:endParaRPr lang="en-US" sz="4800" dirty="0">
+            <a:r>
+              <a:rPr lang="en-US" sz="3600" dirty="0">
+                <a:latin typeface="Klavika Light" panose="020B0506040000020004" pitchFamily="34" charset="0"/>
+              </a:rPr>
+              <a:t>The random intercept shows a student that has no job, no extra curriculars, present every day, and no study hours each week earn a 77.84% on average, with SD of 0.31%</a:t>
+            </a:r>
+          </a:p>
+          <a:p>
+            <a:pPr marL="342900"/>
+            <a:endParaRPr lang="en-US" sz="3600" dirty="0">
               <a:latin typeface="Klavika Light" panose="020B0506040000020004" pitchFamily="34" charset="0"/>
             </a:endParaRPr>
           </a:p>
           <a:p>
             <a:pPr marL="342900"/>
-            <a:endParaRPr lang="en-US" sz="4800" dirty="0">
+            <a:r>
+              <a:rPr lang="en-US" sz="3600" dirty="0">
+                <a:latin typeface="Klavika Light" panose="020B0506040000020004" pitchFamily="34" charset="0"/>
+              </a:rPr>
+              <a:t>Students with a part time job are expected to have an average grade difference of -1.27% points on the estimated average grade, with a SD of 0.33%</a:t>
+            </a:r>
+          </a:p>
+          <a:p>
+            <a:pPr marL="342900"/>
+            <a:endParaRPr lang="en-US" sz="3600" dirty="0">
               <a:latin typeface="Klavika Light" panose="020B0506040000020004" pitchFamily="34" charset="0"/>
             </a:endParaRPr>
           </a:p>
           <a:p>
             <a:pPr marL="342900"/>
-            <a:endParaRPr lang="en-US" sz="4800" dirty="0">
+            <a:r>
+              <a:rPr lang="en-US" sz="3600" dirty="0">
+                <a:latin typeface="Klavika Light" panose="020B0506040000020004" pitchFamily="34" charset="0"/>
+              </a:rPr>
+              <a:t>Each day a student is absent their grade is expected to change by -0.20% per day they are absent, with a SD of 0.05%</a:t>
+            </a:r>
+          </a:p>
+          <a:p>
+            <a:pPr marL="342900"/>
+            <a:endParaRPr lang="en-US" sz="3600" dirty="0">
               <a:latin typeface="Klavika Light" panose="020B0506040000020004" pitchFamily="34" charset="0"/>
             </a:endParaRPr>
           </a:p>
           <a:p>
             <a:pPr marL="342900"/>
-            <a:endParaRPr lang="en-US" sz="4800" dirty="0">
+            <a:r>
+              <a:rPr lang="en-US" sz="3600" dirty="0">
+                <a:latin typeface="Klavika Light" panose="020B0506040000020004" pitchFamily="34" charset="0"/>
+              </a:rPr>
+              <a:t>Students who participate in extra curricular activities show an average difference of -0.09% points with a SD of 0.29%</a:t>
+            </a:r>
+          </a:p>
+          <a:p>
+            <a:pPr marL="342900"/>
+            <a:endParaRPr lang="en-US" sz="3600" dirty="0">
               <a:latin typeface="Klavika Light" panose="020B0506040000020004" pitchFamily="34" charset="0"/>
             </a:endParaRPr>
           </a:p>
           <a:p>
             <a:pPr marL="342900"/>
-            <a:endParaRPr lang="en-US" sz="4800" dirty="0">
-              <a:latin typeface="Klavika Light" panose="020B0506040000020004" pitchFamily="34" charset="0"/>
-            </a:endParaRPr>
-          </a:p>
-          <a:p>
-            <a:pPr marL="342900"/>
-            <a:endParaRPr lang="en-US" sz="4800" dirty="0">
-              <a:latin typeface="Klavika Light" panose="020B0506040000020004" pitchFamily="34" charset="0"/>
-            </a:endParaRPr>
-          </a:p>
-          <a:p>
-            <a:pPr marL="342900"/>
-            <a:endParaRPr lang="en-US" sz="4800" dirty="0">
-              <a:latin typeface="Klavika Light" panose="020B0506040000020004" pitchFamily="34" charset="0"/>
-            </a:endParaRPr>
-          </a:p>
-          <a:p>
-            <a:pPr marL="342900"/>
-            <a:endParaRPr lang="en-US" sz="4800" dirty="0">
-              <a:latin typeface="Klavika Light" panose="020B0506040000020004" pitchFamily="34" charset="0"/>
-            </a:endParaRPr>
-          </a:p>
-          <a:p>
-            <a:pPr marL="342900"/>
-            <a:endParaRPr lang="en-US" sz="4800" dirty="0">
-              <a:latin typeface="Klavika Light" panose="020B0506040000020004" pitchFamily="34" charset="0"/>
-            </a:endParaRPr>
-          </a:p>
-          <a:p>
-            <a:pPr marL="342900"/>
-            <a:endParaRPr lang="en-US" sz="4800" dirty="0">
-              <a:latin typeface="Klavika Light" panose="020B0506040000020004" pitchFamily="34" charset="0"/>
-            </a:endParaRPr>
-          </a:p>
-          <a:p>
-            <a:pPr marL="342900"/>
-            <a:endParaRPr lang="en-US" sz="4800" dirty="0">
-              <a:latin typeface="Klavika Light" panose="020B0506040000020004" pitchFamily="34" charset="0"/>
-            </a:endParaRPr>
-          </a:p>
-          <a:p>
-            <a:pPr marL="1028700" indent="-685800">
-              <a:buFont typeface="Wingdings" panose="05000000000000000000" pitchFamily="2" charset="2"/>
-              <a:buChar char="§"/>
-            </a:pPr>
-            <a:endParaRPr lang="en-US" sz="1000" dirty="0"/>
+            <a:r>
+              <a:rPr lang="en-US" sz="3600" dirty="0">
+                <a:latin typeface="Klavika Light" panose="020B0506040000020004" pitchFamily="34" charset="0"/>
+              </a:rPr>
+              <a:t>Each hour per week a student studies shows and average change of 0.23% per hour with a SD of 0.01%</a:t>
+            </a:r>
           </a:p>
         </p:txBody>
       </p:sp>
@@ -5935,14 +5931,12 @@
           </p:cNvPr>
           <p:cNvCxnSpPr>
             <a:cxnSpLocks/>
-            <a:stCxn id="34" idx="1"/>
-            <a:endCxn id="34" idx="3"/>
           </p:cNvCxnSpPr>
           <p:nvPr/>
         </p:nvCxnSpPr>
         <p:spPr>
           <a:xfrm>
-            <a:off x="373289" y="11031250"/>
+            <a:off x="373289" y="11282979"/>
             <a:ext cx="15819120" cy="0"/>
           </a:xfrm>
           <a:prstGeom prst="line">
@@ -6187,6 +6181,234 @@
       </p:sp>
       <p:sp>
         <p:nvSpPr>
+          <p:cNvPr id="2" name="TextBox 1">
+            <a:extLst>
+              <a:ext uri="{FF2B5EF4-FFF2-40B4-BE49-F238E27FC236}">
+                <a16:creationId xmlns:a16="http://schemas.microsoft.com/office/drawing/2014/main" id="{3A5846D1-7CEC-1CFB-0595-7B824E7C258F}"/>
+              </a:ext>
+            </a:extLst>
+          </p:cNvPr>
+          <p:cNvSpPr txBox="1"/>
+          <p:nvPr/>
+        </p:nvSpPr>
+        <p:spPr>
+          <a:xfrm>
+            <a:off x="4666769" y="25929653"/>
+            <a:ext cx="1917700" cy="369332"/>
+          </a:xfrm>
+          <a:prstGeom prst="rect">
+            <a:avLst/>
+          </a:prstGeom>
+          <a:solidFill>
+            <a:schemeClr val="bg1"/>
+          </a:solidFill>
+        </p:spPr>
+        <p:txBody>
+          <a:bodyPr wrap="square" rtlCol="0">
+            <a:spAutoFit/>
+          </a:bodyPr>
+          <a:lstStyle/>
+          <a:p>
+            <a:pPr algn="ctr"/>
+            <a:r>
+              <a:rPr lang="en-US" dirty="0"/>
+              <a:t>Random Intercept</a:t>
+            </a:r>
+          </a:p>
+        </p:txBody>
+      </p:sp>
+      <p:sp>
+        <p:nvSpPr>
+          <p:cNvPr id="12" name="TextBox 11">
+            <a:extLst>
+              <a:ext uri="{FF2B5EF4-FFF2-40B4-BE49-F238E27FC236}">
+                <a16:creationId xmlns:a16="http://schemas.microsoft.com/office/drawing/2014/main" id="{64005909-372F-D875-1E90-14DF73025454}"/>
+              </a:ext>
+            </a:extLst>
+          </p:cNvPr>
+          <p:cNvSpPr txBox="1"/>
+          <p:nvPr/>
+        </p:nvSpPr>
+        <p:spPr>
+          <a:xfrm>
+            <a:off x="7475641" y="25915394"/>
+            <a:ext cx="1917700" cy="369332"/>
+          </a:xfrm>
+          <a:prstGeom prst="rect">
+            <a:avLst/>
+          </a:prstGeom>
+          <a:solidFill>
+            <a:schemeClr val="bg1"/>
+          </a:solidFill>
+        </p:spPr>
+        <p:txBody>
+          <a:bodyPr wrap="square" rtlCol="0">
+            <a:spAutoFit/>
+          </a:bodyPr>
+          <a:lstStyle/>
+          <a:p>
+            <a:pPr algn="ctr"/>
+            <a:r>
+              <a:rPr lang="en-US" dirty="0"/>
+              <a:t>Part Time Job</a:t>
+            </a:r>
+          </a:p>
+        </p:txBody>
+      </p:sp>
+      <p:sp>
+        <p:nvSpPr>
+          <p:cNvPr id="13" name="TextBox 12">
+            <a:extLst>
+              <a:ext uri="{FF2B5EF4-FFF2-40B4-BE49-F238E27FC236}">
+                <a16:creationId xmlns:a16="http://schemas.microsoft.com/office/drawing/2014/main" id="{0B9A80E2-9765-2C8B-4D0B-3E52F7A38007}"/>
+              </a:ext>
+            </a:extLst>
+          </p:cNvPr>
+          <p:cNvSpPr txBox="1"/>
+          <p:nvPr/>
+        </p:nvSpPr>
+        <p:spPr>
+          <a:xfrm>
+            <a:off x="10417953" y="31207709"/>
+            <a:ext cx="1917700" cy="369332"/>
+          </a:xfrm>
+          <a:prstGeom prst="rect">
+            <a:avLst/>
+          </a:prstGeom>
+          <a:solidFill>
+            <a:schemeClr val="bg1"/>
+          </a:solidFill>
+        </p:spPr>
+        <p:txBody>
+          <a:bodyPr wrap="square" rtlCol="0">
+            <a:spAutoFit/>
+          </a:bodyPr>
+          <a:lstStyle/>
+          <a:p>
+            <a:pPr algn="ctr"/>
+            <a:r>
+              <a:rPr lang="en-US" dirty="0"/>
+              <a:t>Sig2</a:t>
+            </a:r>
+          </a:p>
+        </p:txBody>
+      </p:sp>
+      <p:sp>
+        <p:nvSpPr>
+          <p:cNvPr id="16" name="TextBox 15">
+            <a:extLst>
+              <a:ext uri="{FF2B5EF4-FFF2-40B4-BE49-F238E27FC236}">
+                <a16:creationId xmlns:a16="http://schemas.microsoft.com/office/drawing/2014/main" id="{B5C211E3-849D-5C5D-00F3-D52171195BFE}"/>
+              </a:ext>
+            </a:extLst>
+          </p:cNvPr>
+          <p:cNvSpPr txBox="1"/>
+          <p:nvPr/>
+        </p:nvSpPr>
+        <p:spPr>
+          <a:xfrm>
+            <a:off x="10397491" y="25915394"/>
+            <a:ext cx="1917700" cy="369332"/>
+          </a:xfrm>
+          <a:prstGeom prst="rect">
+            <a:avLst/>
+          </a:prstGeom>
+          <a:solidFill>
+            <a:schemeClr val="bg1"/>
+          </a:solidFill>
+        </p:spPr>
+        <p:txBody>
+          <a:bodyPr wrap="square" rtlCol="0">
+            <a:spAutoFit/>
+          </a:bodyPr>
+          <a:lstStyle/>
+          <a:p>
+            <a:pPr algn="ctr"/>
+            <a:r>
+              <a:rPr lang="en-US" dirty="0"/>
+              <a:t>Absent Days</a:t>
+            </a:r>
+          </a:p>
+        </p:txBody>
+      </p:sp>
+      <p:sp>
+        <p:nvSpPr>
+          <p:cNvPr id="18" name="TextBox 17">
+            <a:extLst>
+              <a:ext uri="{FF2B5EF4-FFF2-40B4-BE49-F238E27FC236}">
+                <a16:creationId xmlns:a16="http://schemas.microsoft.com/office/drawing/2014/main" id="{A95FB072-AFA8-0F1D-A2B9-5383DF1852FC}"/>
+              </a:ext>
+            </a:extLst>
+          </p:cNvPr>
+          <p:cNvSpPr txBox="1"/>
+          <p:nvPr/>
+        </p:nvSpPr>
+        <p:spPr>
+          <a:xfrm>
+            <a:off x="4714673" y="31069209"/>
+            <a:ext cx="1917700" cy="646331"/>
+          </a:xfrm>
+          <a:prstGeom prst="rect">
+            <a:avLst/>
+          </a:prstGeom>
+          <a:solidFill>
+            <a:schemeClr val="bg1"/>
+          </a:solidFill>
+        </p:spPr>
+        <p:txBody>
+          <a:bodyPr wrap="square" rtlCol="0">
+            <a:spAutoFit/>
+          </a:bodyPr>
+          <a:lstStyle/>
+          <a:p>
+            <a:pPr algn="ctr"/>
+            <a:r>
+              <a:rPr lang="en-US" dirty="0"/>
+              <a:t>Extra Curricular Activities</a:t>
+            </a:r>
+          </a:p>
+        </p:txBody>
+      </p:sp>
+      <p:sp>
+        <p:nvSpPr>
+          <p:cNvPr id="21" name="TextBox 20">
+            <a:extLst>
+              <a:ext uri="{FF2B5EF4-FFF2-40B4-BE49-F238E27FC236}">
+                <a16:creationId xmlns:a16="http://schemas.microsoft.com/office/drawing/2014/main" id="{8C5F7537-B1CE-5D08-0050-925FE8902ACD}"/>
+              </a:ext>
+            </a:extLst>
+          </p:cNvPr>
+          <p:cNvSpPr txBox="1"/>
+          <p:nvPr/>
+        </p:nvSpPr>
+        <p:spPr>
+          <a:xfrm>
+            <a:off x="7444217" y="31088063"/>
+            <a:ext cx="1917700" cy="646331"/>
+          </a:xfrm>
+          <a:prstGeom prst="rect">
+            <a:avLst/>
+          </a:prstGeom>
+          <a:solidFill>
+            <a:schemeClr val="bg1"/>
+          </a:solidFill>
+        </p:spPr>
+        <p:txBody>
+          <a:bodyPr wrap="square" rtlCol="0">
+            <a:spAutoFit/>
+          </a:bodyPr>
+          <a:lstStyle/>
+          <a:p>
+            <a:pPr algn="ctr"/>
+            <a:r>
+              <a:rPr lang="en-US" dirty="0"/>
+              <a:t>Weekly Study Hours</a:t>
+            </a:r>
+          </a:p>
+        </p:txBody>
+      </p:sp>
+      <p:sp>
+        <p:nvSpPr>
           <p:cNvPr id="11" name="TextBox 10"/>
           <p:cNvSpPr txBox="1"/>
           <p:nvPr/>
@@ -6220,7 +6442,7 @@
                 </a:solidFill>
                 <a:latin typeface="Klavika Light" panose="020B0506040000020004" pitchFamily="34" charset="0"/>
               </a:rPr>
-              <a:t>Exploratory Data Analysis</a:t>
+              <a:t>Exploratory Data Analysis 	</a:t>
             </a:r>
           </a:p>
         </p:txBody>

</xml_diff>